<commit_message>
Final Project for Review
</commit_message>
<xml_diff>
--- a/Stakeholder Presentation.pptx
+++ b/Stakeholder Presentation.pptx
@@ -236,7 +236,7 @@
           <a:p>
             <a:fld id="{59088EAF-6ECA-4616-85EF-35AA19C641F3}" type="datetimeFigureOut">
               <a:rPr lang="en-US"/>
-              <a:t>5/23/21</a:t>
+              <a:t>5/26/21</a:t>
             </a:fld>
             <a:endParaRPr/>
           </a:p>
@@ -401,7 +401,7 @@
           <a:p>
             <a:fld id="{3ABD2D7A-D230-4F91-BD59-0A39C2703BA8}" type="datetimeFigureOut">
               <a:rPr lang="en-US"/>
-              <a:t>5/23/21</a:t>
+              <a:t>5/26/21</a:t>
             </a:fld>
             <a:endParaRPr/>
           </a:p>
@@ -707,6 +707,90 @@
           <a:bodyPr/>
           <a:lstStyle/>
           <a:p>
+            <a:endParaRPr lang="en-US" dirty="0"/>
+          </a:p>
+        </p:txBody>
+      </p:sp>
+      <p:sp>
+        <p:nvSpPr>
+          <p:cNvPr id="4" name="Slide Number Placeholder 3"/>
+          <p:cNvSpPr>
+            <a:spLocks noGrp="1"/>
+          </p:cNvSpPr>
+          <p:nvPr>
+            <p:ph type="sldNum" sz="quarter" idx="5"/>
+          </p:nvPr>
+        </p:nvSpPr>
+        <p:spPr/>
+        <p:txBody>
+          <a:bodyPr/>
+          <a:lstStyle/>
+          <a:p>
+            <a:fld id="{F93199CD-3E1B-4AE6-990F-76F925F5EA9F}" type="slidenum">
+              <a:rPr lang="en-US" smtClean="0"/>
+              <a:t>4</a:t>
+            </a:fld>
+            <a:endParaRPr lang="en-US"/>
+          </a:p>
+        </p:txBody>
+      </p:sp>
+    </p:spTree>
+    <p:extLst>
+      <p:ext uri="{BB962C8B-B14F-4D97-AF65-F5344CB8AC3E}">
+        <p14:creationId xmlns:p14="http://schemas.microsoft.com/office/powerpoint/2010/main" val="1529270263"/>
+      </p:ext>
+    </p:extLst>
+  </p:cSld>
+  <p:clrMapOvr>
+    <a:masterClrMapping/>
+  </p:clrMapOvr>
+</p:notes>
+</file>
+
+<file path=ppt/notesSlides/notesSlide2.xml><?xml version="1.0" encoding="utf-8"?>
+<p:notes xmlns:a="http://schemas.openxmlformats.org/drawingml/2006/main" xmlns:r="http://schemas.openxmlformats.org/officeDocument/2006/relationships" xmlns:p="http://schemas.openxmlformats.org/presentationml/2006/main">
+  <p:cSld>
+    <p:spTree>
+      <p:nvGrpSpPr>
+        <p:cNvPr id="1" name=""/>
+        <p:cNvGrpSpPr/>
+        <p:nvPr/>
+      </p:nvGrpSpPr>
+      <p:grpSpPr>
+        <a:xfrm>
+          <a:off x="0" y="0"/>
+          <a:ext cx="0" cy="0"/>
+          <a:chOff x="0" y="0"/>
+          <a:chExt cx="0" cy="0"/>
+        </a:xfrm>
+      </p:grpSpPr>
+      <p:sp>
+        <p:nvSpPr>
+          <p:cNvPr id="2" name="Slide Image Placeholder 1"/>
+          <p:cNvSpPr>
+            <a:spLocks noGrp="1" noRot="1" noChangeAspect="1"/>
+          </p:cNvSpPr>
+          <p:nvPr>
+            <p:ph type="sldImg"/>
+          </p:nvPr>
+        </p:nvSpPr>
+        <p:spPr/>
+      </p:sp>
+      <p:sp>
+        <p:nvSpPr>
+          <p:cNvPr id="3" name="Notes Placeholder 2"/>
+          <p:cNvSpPr>
+            <a:spLocks noGrp="1"/>
+          </p:cNvSpPr>
+          <p:nvPr>
+            <p:ph type="body" idx="1"/>
+          </p:nvPr>
+        </p:nvSpPr>
+        <p:spPr/>
+        <p:txBody>
+          <a:bodyPr/>
+          <a:lstStyle/>
+          <a:p>
             <a:r>
               <a:rPr lang="en-US" dirty="0"/>
               <a:t>The estimates for full bathroom square feet from an online search for ”average full bathroom size”. </a:t>
@@ -1097,7 +1181,7 @@
           <a:p>
             <a:fld id="{03F41C87-7AD9-4845-A077-840E4A0F3F06}" type="datetimeFigureOut">
               <a:rPr lang="en-US"/>
-              <a:t>5/23/21</a:t>
+              <a:t>5/26/21</a:t>
             </a:fld>
             <a:endParaRPr/>
           </a:p>
@@ -1289,7 +1373,7 @@
           <a:p>
             <a:fld id="{03F41C87-7AD9-4845-A077-840E4A0F3F06}" type="datetimeFigureOut">
               <a:rPr lang="en-US"/>
-              <a:t>5/23/21</a:t>
+              <a:t>5/26/21</a:t>
             </a:fld>
             <a:endParaRPr/>
           </a:p>
@@ -1478,7 +1562,7 @@
           <a:p>
             <a:fld id="{03F41C87-7AD9-4845-A077-840E4A0F3F06}" type="datetimeFigureOut">
               <a:rPr lang="en-US"/>
-              <a:t>5/23/21</a:t>
+              <a:t>5/26/21</a:t>
             </a:fld>
             <a:endParaRPr/>
           </a:p>
@@ -1758,7 +1842,7 @@
           <a:p>
             <a:fld id="{03F41C87-7AD9-4845-A077-840E4A0F3F06}" type="datetimeFigureOut">
               <a:rPr lang="en-US"/>
-              <a:t>5/23/21</a:t>
+              <a:t>5/26/21</a:t>
             </a:fld>
             <a:endParaRPr/>
           </a:p>
@@ -2062,7 +2146,7 @@
           <a:p>
             <a:fld id="{03F41C87-7AD9-4845-A077-840E4A0F3F06}" type="datetimeFigureOut">
               <a:rPr lang="en-US"/>
-              <a:t>5/23/21</a:t>
+              <a:t>5/26/21</a:t>
             </a:fld>
             <a:endParaRPr/>
           </a:p>
@@ -2518,7 +2602,7 @@
           <a:p>
             <a:fld id="{03F41C87-7AD9-4845-A077-840E4A0F3F06}" type="datetimeFigureOut">
               <a:rPr lang="en-US"/>
-              <a:t>5/23/21</a:t>
+              <a:t>5/26/21</a:t>
             </a:fld>
             <a:endParaRPr/>
           </a:p>
@@ -2648,7 +2732,7 @@
           <a:p>
             <a:fld id="{03F41C87-7AD9-4845-A077-840E4A0F3F06}" type="datetimeFigureOut">
               <a:rPr lang="en-US"/>
-              <a:t>5/23/21</a:t>
+              <a:t>5/26/21</a:t>
             </a:fld>
             <a:endParaRPr/>
           </a:p>
@@ -2763,7 +2847,7 @@
           <a:p>
             <a:fld id="{03F41C87-7AD9-4845-A077-840E4A0F3F06}" type="datetimeFigureOut">
               <a:rPr lang="en-US"/>
-              <a:t>5/23/21</a:t>
+              <a:t>5/26/21</a:t>
             </a:fld>
             <a:endParaRPr/>
           </a:p>
@@ -3085,7 +3169,7 @@
           <a:p>
             <a:fld id="{03F41C87-7AD9-4845-A077-840E4A0F3F06}" type="datetimeFigureOut">
               <a:rPr lang="en-US"/>
-              <a:t>5/23/21</a:t>
+              <a:t>5/26/21</a:t>
             </a:fld>
             <a:endParaRPr/>
           </a:p>
@@ -3397,7 +3481,7 @@
             <a:fld id="{03F41C87-7AD9-4845-A077-840E4A0F3F06}" type="datetimeFigureOut">
               <a:rPr lang="en-US"/>
               <a:pPr/>
-              <a:t>5/23/21</a:t>
+              <a:t>5/26/21</a:t>
             </a:fld>
             <a:endParaRPr/>
           </a:p>
@@ -3651,7 +3735,7 @@
             <a:fld id="{03F41C87-7AD9-4845-A077-840E4A0F3F06}" type="datetimeFigureOut">
               <a:rPr lang="en-US" smtClean="0"/>
               <a:pPr/>
-              <a:t>5/23/21</a:t>
+              <a:t>5/26/21</a:t>
             </a:fld>
             <a:endParaRPr lang="en-US"/>
           </a:p>
@@ -6445,13 +6529,13 @@
   <p:clrMapOvr>
     <a:masterClrMapping/>
   </p:clrMapOvr>
-  <mc:AlternateContent xmlns:mc="http://schemas.openxmlformats.org/markup-compatibility/2006">
-    <mc:Choice xmlns:p14="http://schemas.microsoft.com/office/powerpoint/2010/main" Requires="p14">
+  <mc:AlternateContent xmlns:mc="http://schemas.openxmlformats.org/markup-compatibility/2006" xmlns:p14="http://schemas.microsoft.com/office/powerpoint/2010/main">
+    <mc:Choice Requires="p14">
       <p:transition spd="med" p14:dur="700">
         <p:fade/>
       </p:transition>
     </mc:Choice>
-    <mc:Fallback>
+    <mc:Fallback xmlns="">
       <p:transition spd="med">
         <p:fade/>
       </p:transition>
@@ -6608,13 +6692,13 @@
   <p:clrMapOvr>
     <a:masterClrMapping/>
   </p:clrMapOvr>
-  <mc:AlternateContent xmlns:mc="http://schemas.openxmlformats.org/markup-compatibility/2006">
-    <mc:Choice xmlns:p14="http://schemas.microsoft.com/office/powerpoint/2010/main" Requires="p14">
+  <mc:AlternateContent xmlns:mc="http://schemas.openxmlformats.org/markup-compatibility/2006" xmlns:p14="http://schemas.microsoft.com/office/powerpoint/2010/main">
+    <mc:Choice Requires="p14">
       <p:transition spd="med" p14:dur="700">
         <p:fade/>
       </p:transition>
     </mc:Choice>
-    <mc:Fallback>
+    <mc:Fallback xmlns="">
       <p:transition spd="med">
         <p:fade/>
       </p:transition>
@@ -7788,13 +7872,13 @@
   <p:clrMapOvr>
     <a:masterClrMapping/>
   </p:clrMapOvr>
-  <mc:AlternateContent xmlns:mc="http://schemas.openxmlformats.org/markup-compatibility/2006">
-    <mc:Choice xmlns:p14="http://schemas.microsoft.com/office/powerpoint/2010/main" Requires="p14">
+  <mc:AlternateContent xmlns:mc="http://schemas.openxmlformats.org/markup-compatibility/2006" xmlns:p14="http://schemas.microsoft.com/office/powerpoint/2010/main">
+    <mc:Choice Requires="p14">
       <p:transition spd="med" p14:dur="700">
         <p:fade/>
       </p:transition>
     </mc:Choice>
-    <mc:Fallback>
+    <mc:Fallback xmlns="">
       <p:transition spd="med">
         <p:fade/>
       </p:transition>
@@ -7934,13 +8018,13 @@
   <p:clrMapOvr>
     <a:masterClrMapping/>
   </p:clrMapOvr>
-  <mc:AlternateContent xmlns:mc="http://schemas.openxmlformats.org/markup-compatibility/2006">
-    <mc:Choice xmlns:p14="http://schemas.microsoft.com/office/powerpoint/2010/main" Requires="p14">
+  <mc:AlternateContent xmlns:mc="http://schemas.openxmlformats.org/markup-compatibility/2006" xmlns:p14="http://schemas.microsoft.com/office/powerpoint/2010/main">
+    <mc:Choice Requires="p14">
       <p:transition spd="med" p14:dur="700">
         <p:fade/>
       </p:transition>
     </mc:Choice>
-    <mc:Fallback>
+    <mc:Fallback xmlns="">
       <p:transition spd="med">
         <p:fade/>
       </p:transition>
@@ -8017,19 +8101,67 @@
           <a:p>
             <a:r>
               <a:rPr lang="en-US" dirty="0"/>
-              <a:t>Tanzania has almost 60,000 water wells in dataset with 45% not functional, leaving 4.6M people without a reliable water source</a:t>
-            </a:r>
-          </a:p>
-          <a:p>
+              <a:t>Tanzania has almost </a:t>
+            </a:r>
+            <a:r>
+              <a:rPr lang="en-US" dirty="0">
+                <a:solidFill>
+                  <a:srgbClr val="FF0000"/>
+                </a:solidFill>
+              </a:rPr>
+              <a:t>60,000 water wells</a:t>
+            </a:r>
             <a:r>
               <a:rPr lang="en-US" dirty="0"/>
-              <a:t>Humans can only live up to 3 days without water</a:t>
-            </a:r>
-          </a:p>
-          <a:p>
+              <a:t> in dataset with </a:t>
+            </a:r>
+            <a:r>
+              <a:rPr lang="en-US" dirty="0">
+                <a:solidFill>
+                  <a:srgbClr val="FF0000"/>
+                </a:solidFill>
+              </a:rPr>
+              <a:t>45% not functional</a:t>
+            </a:r>
             <a:r>
               <a:rPr lang="en-US" dirty="0"/>
-              <a:t>Ability to predict water well failures and respond quickly can be the difference between life and death</a:t>
+              <a:t>, leaving almost </a:t>
+            </a:r>
+            <a:r>
+              <a:rPr lang="en-US" dirty="0">
+                <a:solidFill>
+                  <a:srgbClr val="FF0000"/>
+                </a:solidFill>
+              </a:rPr>
+              <a:t>7M people without a reliable water source</a:t>
+            </a:r>
+          </a:p>
+          <a:p>
+            <a:r>
+              <a:rPr lang="en-US" dirty="0"/>
+              <a:t>Humans can only live up to </a:t>
+            </a:r>
+            <a:r>
+              <a:rPr lang="en-US" dirty="0">
+                <a:solidFill>
+                  <a:srgbClr val="FF0000"/>
+                </a:solidFill>
+              </a:rPr>
+              <a:t>3 days without water</a:t>
+            </a:r>
+          </a:p>
+          <a:p>
+            <a:r>
+              <a:rPr lang="en-US" dirty="0"/>
+              <a:t>Ability to predict water well failures and respond quickly can be the </a:t>
+            </a:r>
+            <a:r>
+              <a:rPr lang="en-US" dirty="0">
+                <a:solidFill>
+                  <a:srgbClr val="FF0000"/>
+                </a:solidFill>
+              </a:rPr>
+              <a:t>difference between life and death</a:t>
             </a:r>
           </a:p>
         </p:txBody>
@@ -8348,13 +8480,13 @@
   <p:clrMapOvr>
     <a:masterClrMapping/>
   </p:clrMapOvr>
-  <mc:AlternateContent xmlns:mc="http://schemas.openxmlformats.org/markup-compatibility/2006">
-    <mc:Choice xmlns:p14="http://schemas.microsoft.com/office/powerpoint/2010/main" Requires="p14">
+  <mc:AlternateContent xmlns:mc="http://schemas.openxmlformats.org/markup-compatibility/2006" xmlns:p14="http://schemas.microsoft.com/office/powerpoint/2010/main">
+    <mc:Choice Requires="p14">
       <p:transition spd="med" p14:dur="700">
         <p:fade/>
       </p:transition>
     </mc:Choice>
-    <mc:Fallback>
+    <mc:Fallback xmlns="">
       <p:transition spd="med">
         <p:fade/>
       </p:transition>
@@ -8419,7 +8551,7 @@
         </p:nvSpPr>
         <p:spPr>
           <a:xfrm>
-            <a:off x="6661250" y="2251239"/>
+            <a:off x="6661250" y="2033600"/>
             <a:ext cx="5047593" cy="3641071"/>
           </a:xfrm>
         </p:spPr>
@@ -8431,19 +8563,59 @@
           <a:p>
             <a:r>
               <a:rPr lang="en-US" dirty="0"/>
-              <a:t>Almost 19,000 water wells with zeros for population, head, well elevation and construction year</a:t>
-            </a:r>
-          </a:p>
-          <a:p>
+              <a:t>Almost </a:t>
+            </a:r>
+            <a:r>
+              <a:rPr lang="en-US" dirty="0">
+                <a:solidFill>
+                  <a:srgbClr val="FF0000"/>
+                </a:solidFill>
+              </a:rPr>
+              <a:t>18,000 water wells with zeros</a:t>
+            </a:r>
             <a:r>
               <a:rPr lang="en-US" dirty="0"/>
-              <a:t>Outliers and improbable values  in head and population that can skew results</a:t>
-            </a:r>
-          </a:p>
-          <a:p>
+              <a:t> for population, head, well elevation and construction year</a:t>
+            </a:r>
+          </a:p>
+          <a:p>
+            <a:r>
+              <a:rPr lang="en-US" dirty="0">
+                <a:solidFill>
+                  <a:srgbClr val="FF0000"/>
+                </a:solidFill>
+              </a:rPr>
+              <a:t>Outliers </a:t>
+            </a:r>
             <a:r>
               <a:rPr lang="en-US" dirty="0"/>
-              <a:t>Zeros in construction year were converted to years based on distribution of non-zero values</a:t>
+              <a:t>and improbable values  in the </a:t>
+            </a:r>
+            <a:r>
+              <a:rPr lang="en-US" dirty="0">
+                <a:solidFill>
+                  <a:srgbClr val="FF0000"/>
+                </a:solidFill>
+              </a:rPr>
+              <a:t>head</a:t>
+            </a:r>
+            <a:r>
+              <a:rPr lang="en-US" dirty="0"/>
+              <a:t> that can skew results</a:t>
+            </a:r>
+          </a:p>
+          <a:p>
+            <a:r>
+              <a:rPr lang="en-US" dirty="0">
+                <a:solidFill>
+                  <a:srgbClr val="FF0000"/>
+                </a:solidFill>
+              </a:rPr>
+              <a:t>Zeros in construction year </a:t>
+            </a:r>
+            <a:r>
+              <a:rPr lang="en-US" dirty="0"/>
+              <a:t>were converted to years based on distribution of non-zero values</a:t>
             </a:r>
           </a:p>
         </p:txBody>
@@ -8462,7 +8634,7 @@
         </p:nvSpPr>
         <p:spPr>
           <a:xfrm>
-            <a:off x="-220164" y="1183329"/>
+            <a:off x="-220164" y="1074509"/>
             <a:ext cx="6881414" cy="4708981"/>
           </a:xfrm>
           <a:prstGeom prst="rect">
@@ -8479,7 +8651,7 @@
             <a:pPr algn="r"/>
             <a:r>
               <a:rPr lang="en-US" sz="30000" b="1" dirty="0"/>
-              <a:t>19K</a:t>
+              <a:t>18K</a:t>
             </a:r>
           </a:p>
         </p:txBody>
@@ -8565,7 +8737,7 @@
         </p:nvSpPr>
         <p:spPr>
           <a:xfrm>
-            <a:off x="6906506" y="1788910"/>
+            <a:off x="6906506" y="2138776"/>
             <a:ext cx="4953000" cy="4039092"/>
           </a:xfrm>
         </p:spPr>
@@ -8660,7 +8832,7 @@
         </p:nvGrpSpPr>
         <p:grpSpPr>
           <a:xfrm>
-            <a:off x="169204" y="1430842"/>
+            <a:off x="169204" y="1476795"/>
             <a:ext cx="3641831" cy="2053243"/>
             <a:chOff x="-124884" y="1673567"/>
             <a:chExt cx="4015953" cy="2264171"/>
@@ -9064,7 +9236,7 @@
         </p:nvGrpSpPr>
         <p:grpSpPr>
           <a:xfrm>
-            <a:off x="3515859" y="793492"/>
+            <a:off x="3515859" y="839445"/>
             <a:ext cx="2983900" cy="2313074"/>
             <a:chOff x="358570" y="3364376"/>
             <a:chExt cx="4336401" cy="3361512"/>
@@ -9412,7 +9584,7 @@
         </p:nvSpPr>
         <p:spPr>
           <a:xfrm>
-            <a:off x="3223991" y="1991552"/>
+            <a:off x="3223991" y="2121409"/>
             <a:ext cx="546538" cy="305590"/>
           </a:xfrm>
           <a:prstGeom prst="rightArrow">
@@ -9446,10 +9618,10 @@
       </p:sp>
       <p:grpSp>
         <p:nvGrpSpPr>
-          <p:cNvPr id="53" name="Group 52">
+          <p:cNvPr id="61" name="Group 60">
             <a:extLst>
               <a:ext uri="{FF2B5EF4-FFF2-40B4-BE49-F238E27FC236}">
-                <a16:creationId xmlns:a16="http://schemas.microsoft.com/office/drawing/2014/main" id="{373629C1-C5D4-0345-9176-E71749972D57}"/>
+                <a16:creationId xmlns:a16="http://schemas.microsoft.com/office/drawing/2014/main" id="{225B8433-1000-8845-ABDA-298A55545B8F}"/>
               </a:ext>
             </a:extLst>
           </p:cNvPr>
@@ -9458,18 +9630,18 @@
         </p:nvGrpSpPr>
         <p:grpSpPr>
           <a:xfrm>
-            <a:off x="243163" y="3352156"/>
-            <a:ext cx="5943453" cy="3482595"/>
-            <a:chOff x="243163" y="3352156"/>
-            <a:chExt cx="5943453" cy="3482595"/>
+            <a:off x="107648" y="3454570"/>
+            <a:ext cx="6444419" cy="3280278"/>
+            <a:chOff x="107648" y="3120306"/>
+            <a:chExt cx="6444419" cy="3720870"/>
           </a:xfrm>
         </p:grpSpPr>
         <p:grpSp>
           <p:nvGrpSpPr>
-            <p:cNvPr id="51" name="Group 50">
+            <p:cNvPr id="53" name="Group 52">
               <a:extLst>
                 <a:ext uri="{FF2B5EF4-FFF2-40B4-BE49-F238E27FC236}">
-                  <a16:creationId xmlns:a16="http://schemas.microsoft.com/office/drawing/2014/main" id="{E0A72EE5-2104-1549-8027-312A2637655B}"/>
+                  <a16:creationId xmlns:a16="http://schemas.microsoft.com/office/drawing/2014/main" id="{373629C1-C5D4-0345-9176-E71749972D57}"/>
                 </a:ext>
               </a:extLst>
             </p:cNvPr>
@@ -9478,108 +9650,18 @@
           </p:nvGrpSpPr>
           <p:grpSpPr>
             <a:xfrm>
-              <a:off x="243163" y="3352156"/>
-              <a:ext cx="5943453" cy="3482595"/>
-              <a:chOff x="243163" y="3352156"/>
-              <a:chExt cx="5943453" cy="3482595"/>
+              <a:off x="107648" y="3123571"/>
+              <a:ext cx="6444419" cy="3711180"/>
+              <a:chOff x="107648" y="3123571"/>
+              <a:chExt cx="6444419" cy="3711180"/>
             </a:xfrm>
           </p:grpSpPr>
-          <p:cxnSp>
-            <p:nvCxnSpPr>
-              <p:cNvPr id="49" name="Straight Connector 48">
+          <p:grpSp>
+            <p:nvGrpSpPr>
+              <p:cNvPr id="51" name="Group 50">
                 <a:extLst>
                   <a:ext uri="{FF2B5EF4-FFF2-40B4-BE49-F238E27FC236}">
-                    <a16:creationId xmlns:a16="http://schemas.microsoft.com/office/drawing/2014/main" id="{3E0FA638-9B35-CC4D-A738-ECF527C94AC7}"/>
-                  </a:ext>
-                </a:extLst>
-              </p:cNvPr>
-              <p:cNvCxnSpPr>
-                <a:cxnSpLocks/>
-              </p:cNvCxnSpPr>
-              <p:nvPr/>
-            </p:nvCxnSpPr>
-            <p:spPr>
-              <a:xfrm>
-                <a:off x="934096" y="5463104"/>
-                <a:ext cx="5044648" cy="0"/>
-              </a:xfrm>
-              <a:prstGeom prst="line">
-                <a:avLst/>
-              </a:prstGeom>
-              <a:ln w="6350">
-                <a:solidFill>
-                  <a:schemeClr val="tx1">
-                    <a:lumMod val="85000"/>
-                  </a:schemeClr>
-                </a:solidFill>
-              </a:ln>
-            </p:spPr>
-            <p:style>
-              <a:lnRef idx="1">
-                <a:schemeClr val="accent1"/>
-              </a:lnRef>
-              <a:fillRef idx="0">
-                <a:schemeClr val="accent1"/>
-              </a:fillRef>
-              <a:effectRef idx="0">
-                <a:schemeClr val="accent1"/>
-              </a:effectRef>
-              <a:fontRef idx="minor">
-                <a:schemeClr val="tx1"/>
-              </a:fontRef>
-            </p:style>
-          </p:cxnSp>
-          <p:cxnSp>
-            <p:nvCxnSpPr>
-              <p:cNvPr id="42" name="Straight Connector 41">
-                <a:extLst>
-                  <a:ext uri="{FF2B5EF4-FFF2-40B4-BE49-F238E27FC236}">
-                    <a16:creationId xmlns:a16="http://schemas.microsoft.com/office/drawing/2014/main" id="{8BA8229D-FADF-0E4C-8D3A-FF7E6C292A8B}"/>
-                  </a:ext>
-                </a:extLst>
-              </p:cNvPr>
-              <p:cNvCxnSpPr>
-                <a:cxnSpLocks/>
-              </p:cNvCxnSpPr>
-              <p:nvPr/>
-            </p:nvCxnSpPr>
-            <p:spPr>
-              <a:xfrm>
-                <a:off x="958910" y="3778466"/>
-                <a:ext cx="5044648" cy="0"/>
-              </a:xfrm>
-              <a:prstGeom prst="line">
-                <a:avLst/>
-              </a:prstGeom>
-              <a:ln w="6350">
-                <a:solidFill>
-                  <a:schemeClr val="tx1">
-                    <a:lumMod val="85000"/>
-                  </a:schemeClr>
-                </a:solidFill>
-              </a:ln>
-            </p:spPr>
-            <p:style>
-              <a:lnRef idx="1">
-                <a:schemeClr val="accent1"/>
-              </a:lnRef>
-              <a:fillRef idx="0">
-                <a:schemeClr val="accent1"/>
-              </a:fillRef>
-              <a:effectRef idx="0">
-                <a:schemeClr val="accent1"/>
-              </a:effectRef>
-              <a:fontRef idx="minor">
-                <a:schemeClr val="tx1"/>
-              </a:fontRef>
-            </p:style>
-          </p:cxnSp>
-          <p:grpSp>
-            <p:nvGrpSpPr>
-              <p:cNvPr id="40" name="Group 39">
-                <a:extLst>
-                  <a:ext uri="{FF2B5EF4-FFF2-40B4-BE49-F238E27FC236}">
-                    <a16:creationId xmlns:a16="http://schemas.microsoft.com/office/drawing/2014/main" id="{83BACFBB-68AA-6C49-B613-56270D4FE153}"/>
+                    <a16:creationId xmlns:a16="http://schemas.microsoft.com/office/drawing/2014/main" id="{E0A72EE5-2104-1549-8027-312A2637655B}"/>
                   </a:ext>
                 </a:extLst>
               </p:cNvPr>
@@ -9588,18 +9670,108 @@
             </p:nvGrpSpPr>
             <p:grpSpPr>
               <a:xfrm>
-                <a:off x="243163" y="3352156"/>
-                <a:ext cx="5943453" cy="3482595"/>
-                <a:chOff x="243163" y="3352156"/>
-                <a:chExt cx="5943453" cy="3482595"/>
+                <a:off x="107648" y="3425709"/>
+                <a:ext cx="6444419" cy="3409042"/>
+                <a:chOff x="107648" y="3425709"/>
+                <a:chExt cx="6444419" cy="3409042"/>
               </a:xfrm>
             </p:grpSpPr>
+            <p:cxnSp>
+              <p:nvCxnSpPr>
+                <p:cNvPr id="49" name="Straight Connector 48">
+                  <a:extLst>
+                    <a:ext uri="{FF2B5EF4-FFF2-40B4-BE49-F238E27FC236}">
+                      <a16:creationId xmlns:a16="http://schemas.microsoft.com/office/drawing/2014/main" id="{3E0FA638-9B35-CC4D-A738-ECF527C94AC7}"/>
+                    </a:ext>
+                  </a:extLst>
+                </p:cNvPr>
+                <p:cNvCxnSpPr>
+                  <a:cxnSpLocks/>
+                </p:cNvCxnSpPr>
+                <p:nvPr/>
+              </p:nvCxnSpPr>
+              <p:spPr>
+                <a:xfrm>
+                  <a:off x="934096" y="5828002"/>
+                  <a:ext cx="5434912" cy="0"/>
+                </a:xfrm>
+                <a:prstGeom prst="line">
+                  <a:avLst/>
+                </a:prstGeom>
+                <a:ln w="6350">
+                  <a:solidFill>
+                    <a:schemeClr val="tx1">
+                      <a:lumMod val="85000"/>
+                    </a:schemeClr>
+                  </a:solidFill>
+                </a:ln>
+              </p:spPr>
+              <p:style>
+                <a:lnRef idx="1">
+                  <a:schemeClr val="accent1"/>
+                </a:lnRef>
+                <a:fillRef idx="0">
+                  <a:schemeClr val="accent1"/>
+                </a:fillRef>
+                <a:effectRef idx="0">
+                  <a:schemeClr val="accent1"/>
+                </a:effectRef>
+                <a:fontRef idx="minor">
+                  <a:schemeClr val="tx1"/>
+                </a:fontRef>
+              </p:style>
+            </p:cxnSp>
+            <p:cxnSp>
+              <p:nvCxnSpPr>
+                <p:cNvPr id="42" name="Straight Connector 41">
+                  <a:extLst>
+                    <a:ext uri="{FF2B5EF4-FFF2-40B4-BE49-F238E27FC236}">
+                      <a16:creationId xmlns:a16="http://schemas.microsoft.com/office/drawing/2014/main" id="{8BA8229D-FADF-0E4C-8D3A-FF7E6C292A8B}"/>
+                    </a:ext>
+                  </a:extLst>
+                </p:cNvPr>
+                <p:cNvCxnSpPr>
+                  <a:cxnSpLocks/>
+                </p:cNvCxnSpPr>
+                <p:nvPr/>
+              </p:nvCxnSpPr>
+              <p:spPr>
+                <a:xfrm>
+                  <a:off x="958910" y="4650336"/>
+                  <a:ext cx="5410098" cy="0"/>
+                </a:xfrm>
+                <a:prstGeom prst="line">
+                  <a:avLst/>
+                </a:prstGeom>
+                <a:ln w="6350">
+                  <a:solidFill>
+                    <a:schemeClr val="tx1">
+                      <a:lumMod val="85000"/>
+                    </a:schemeClr>
+                  </a:solidFill>
+                </a:ln>
+              </p:spPr>
+              <p:style>
+                <a:lnRef idx="1">
+                  <a:schemeClr val="accent1"/>
+                </a:lnRef>
+                <a:fillRef idx="0">
+                  <a:schemeClr val="accent1"/>
+                </a:fillRef>
+                <a:effectRef idx="0">
+                  <a:schemeClr val="accent1"/>
+                </a:effectRef>
+                <a:fontRef idx="minor">
+                  <a:schemeClr val="tx1"/>
+                </a:fontRef>
+              </p:style>
+            </p:cxnSp>
             <p:grpSp>
               <p:nvGrpSpPr>
-                <p:cNvPr id="32" name="Group 31">
+                <p:cNvPr id="40" name="Group 39">
                   <a:extLst>
                     <a:ext uri="{FF2B5EF4-FFF2-40B4-BE49-F238E27FC236}">
-                      <a16:creationId xmlns:a16="http://schemas.microsoft.com/office/drawing/2014/main" id="{FAAAFC43-77D2-5A4D-AEE6-07EBF506354B}"/>
+                      <a16:creationId xmlns:a16="http://schemas.microsoft.com/office/drawing/2014/main" id="{83BACFBB-68AA-6C49-B613-56270D4FE153}"/>
                     </a:ext>
                   </a:extLst>
                 </p:cNvPr>
@@ -9608,101 +9780,18 @@
               </p:nvGrpSpPr>
               <p:grpSpPr>
                 <a:xfrm>
-                  <a:off x="547212" y="3352156"/>
-                  <a:ext cx="5639404" cy="3285933"/>
-                  <a:chOff x="665731" y="3499035"/>
-                  <a:chExt cx="5015194" cy="2922223"/>
+                  <a:off x="107648" y="3425709"/>
+                  <a:ext cx="6444419" cy="3409042"/>
+                  <a:chOff x="107648" y="3425709"/>
+                  <a:chExt cx="6444419" cy="3409042"/>
                 </a:xfrm>
               </p:grpSpPr>
-              <p:pic>
-                <p:nvPicPr>
-                  <p:cNvPr id="25" name="Picture 24" descr="Chart, histogram&#10;&#10;Description automatically generated">
+              <p:grpSp>
+                <p:nvGrpSpPr>
+                  <p:cNvPr id="32" name="Group 31">
                     <a:extLst>
                       <a:ext uri="{FF2B5EF4-FFF2-40B4-BE49-F238E27FC236}">
-                        <a16:creationId xmlns:a16="http://schemas.microsoft.com/office/drawing/2014/main" id="{C848EEDB-44A4-EA40-BCA7-814457002E11}"/>
-                      </a:ext>
-                    </a:extLst>
-                  </p:cNvPr>
-                  <p:cNvPicPr>
-                    <a:picLocks noChangeAspect="1"/>
-                  </p:cNvPicPr>
-                  <p:nvPr/>
-                </p:nvPicPr>
-                <p:blipFill>
-                  <a:blip r:embed="rId2">
-                    <a:duotone>
-                      <a:prstClr val="black"/>
-                      <a:schemeClr val="tx1">
-                        <a:tint val="45000"/>
-                        <a:satMod val="400000"/>
-                      </a:schemeClr>
-                    </a:duotone>
-                    <a:extLst>
-                      <a:ext uri="{BEBA8EAE-BF5A-486C-A8C5-ECC9F3942E4B}">
-                        <a14:imgProps xmlns:a14="http://schemas.microsoft.com/office/drawing/2010/main">
-                          <a14:imgLayer r:embed="rId3">
-                            <a14:imgEffect>
-                              <a14:backgroundRemoval t="9717" b="95818" l="10000" r="94000">
-                                <a14:foregroundMark x1="13630" y1="95572" x2="13630" y2="95572"/>
-                                <a14:foregroundMark x1="17481" y1="95572" x2="17481" y2="95572"/>
-                                <a14:foregroundMark x1="23630" y1="95572" x2="23630" y2="95572"/>
-                                <a14:foregroundMark x1="28148" y1="93604" x2="28148" y2="93604"/>
-                                <a14:foregroundMark x1="46593" y1="89791" x2="46593" y2="89791"/>
-                                <a14:foregroundMark x1="62889" y1="86839" x2="62889" y2="86839"/>
-                                <a14:foregroundMark x1="68296" y1="84871" x2="68296" y2="84871"/>
-                                <a14:foregroundMark x1="81630" y1="82411" x2="81630" y2="82411"/>
-                                <a14:foregroundMark x1="94000" y1="81919" x2="94000" y2="81919"/>
-                                <a14:foregroundMark x1="88963" y1="80197" x2="88963" y2="80197"/>
-                                <a14:foregroundMark x1="73630" y1="82903" x2="73630" y2="82903"/>
-                                <a14:foregroundMark x1="77407" y1="82657" x2="77407" y2="82657"/>
-                                <a14:foregroundMark x1="46000" y1="90898" x2="46000" y2="90898"/>
-                                <a14:foregroundMark x1="36148" y1="84133" x2="36148" y2="84133"/>
-                                <a14:foregroundMark x1="39481" y1="82657" x2="39481" y2="82657"/>
-                                <a14:foregroundMark x1="37852" y1="81181" x2="37704" y2="81919"/>
-                                <a14:foregroundMark x1="37778" y1="83641" x2="38370" y2="94957"/>
-                                <a14:foregroundMark x1="38148" y1="95818" x2="37704" y2="88807"/>
-                                <a14:foregroundMark x1="37704" y1="88807" x2="38148" y2="86224"/>
-                                <a14:foregroundMark x1="37926" y1="84625" x2="38222" y2="93481"/>
-                                <a14:foregroundMark x1="37926" y1="83272" x2="38444" y2="95449"/>
-                              </a14:backgroundRemoval>
-                            </a14:imgEffect>
-                            <a14:imgEffect>
-                              <a14:sharpenSoften amount="50000"/>
-                            </a14:imgEffect>
-                            <a14:imgEffect>
-                              <a14:colorTemperature colorTemp="4700"/>
-                            </a14:imgEffect>
-                            <a14:imgEffect>
-                              <a14:brightnessContrast bright="40000" contrast="40000"/>
-                            </a14:imgEffect>
-                          </a14:imgLayer>
-                        </a14:imgProps>
-                      </a:ext>
-                      <a:ext uri="{28A0092B-C50C-407E-A947-70E740481C1C}">
-                        <a14:useLocalDpi xmlns:a14="http://schemas.microsoft.com/office/drawing/2010/main" val="0"/>
-                      </a:ext>
-                    </a:extLst>
-                  </a:blip>
-                  <a:stretch>
-                    <a:fillRect/>
-                  </a:stretch>
-                </p:blipFill>
-                <p:spPr>
-                  <a:xfrm>
-                    <a:off x="665731" y="3499035"/>
-                    <a:ext cx="4852398" cy="2922223"/>
-                  </a:xfrm>
-                  <a:prstGeom prst="rect">
-                    <a:avLst/>
-                  </a:prstGeom>
-                </p:spPr>
-              </p:pic>
-              <p:grpSp>
-                <p:nvGrpSpPr>
-                  <p:cNvPr id="31" name="Group 30">
-                    <a:extLst>
-                      <a:ext uri="{FF2B5EF4-FFF2-40B4-BE49-F238E27FC236}">
-                        <a16:creationId xmlns:a16="http://schemas.microsoft.com/office/drawing/2014/main" id="{A7A10A9D-5DF9-C147-9348-5EBAA194C829}"/>
+                        <a16:creationId xmlns:a16="http://schemas.microsoft.com/office/drawing/2014/main" id="{FAAAFC43-77D2-5A4D-AEE6-07EBF506354B}"/>
                       </a:ext>
                     </a:extLst>
                   </p:cNvPr>
@@ -9711,108 +9800,358 @@
                 </p:nvGrpSpPr>
                 <p:grpSpPr>
                   <a:xfrm>
-                    <a:off x="1009792" y="3564446"/>
-                    <a:ext cx="4671133" cy="2813602"/>
-                    <a:chOff x="766119" y="3607657"/>
-                    <a:chExt cx="4671133" cy="2813602"/>
+                    <a:off x="912662" y="3425709"/>
+                    <a:ext cx="5639405" cy="3212377"/>
+                    <a:chOff x="990730" y="3564446"/>
+                    <a:chExt cx="5015195" cy="2856809"/>
                   </a:xfrm>
                 </p:grpSpPr>
-                <p:cxnSp>
-                  <p:nvCxnSpPr>
-                    <p:cNvPr id="28" name="Straight Connector 27">
+                <p:pic>
+                  <p:nvPicPr>
+                    <p:cNvPr id="25" name="Picture 24" descr="Chart, histogram&#10;&#10;Description automatically generated">
                       <a:extLst>
                         <a:ext uri="{FF2B5EF4-FFF2-40B4-BE49-F238E27FC236}">
-                          <a16:creationId xmlns:a16="http://schemas.microsoft.com/office/drawing/2014/main" id="{E20243C5-930B-934A-A46B-54A60CDC3390}"/>
+                          <a16:creationId xmlns:a16="http://schemas.microsoft.com/office/drawing/2014/main" id="{C848EEDB-44A4-EA40-BCA7-814457002E11}"/>
                         </a:ext>
                       </a:extLst>
                     </p:cNvPr>
-                    <p:cNvCxnSpPr/>
+                    <p:cNvPicPr>
+                      <a:picLocks noChangeAspect="1"/>
+                    </p:cNvPicPr>
                     <p:nvPr/>
-                  </p:nvCxnSpPr>
+                  </p:nvPicPr>
+                  <p:blipFill>
+                    <a:blip r:embed="rId3">
+                      <a:duotone>
+                        <a:prstClr val="black"/>
+                        <a:schemeClr val="tx1">
+                          <a:tint val="45000"/>
+                          <a:satMod val="400000"/>
+                        </a:schemeClr>
+                      </a:duotone>
+                      <a:extLst>
+                        <a:ext uri="{BEBA8EAE-BF5A-486C-A8C5-ECC9F3942E4B}">
+                          <a14:imgProps xmlns:a14="http://schemas.microsoft.com/office/drawing/2010/main">
+                            <a14:imgLayer r:embed="rId4">
+                              <a14:imgEffect>
+                                <a14:backgroundRemoval t="9717" b="95818" l="10000" r="94000">
+                                  <a14:foregroundMark x1="13630" y1="95572" x2="13630" y2="95572"/>
+                                  <a14:foregroundMark x1="17481" y1="95572" x2="17481" y2="95572"/>
+                                  <a14:foregroundMark x1="23630" y1="95572" x2="23630" y2="95572"/>
+                                  <a14:foregroundMark x1="28148" y1="93604" x2="28148" y2="93604"/>
+                                  <a14:foregroundMark x1="46593" y1="89791" x2="46593" y2="89791"/>
+                                  <a14:foregroundMark x1="62889" y1="86839" x2="62889" y2="86839"/>
+                                  <a14:foregroundMark x1="68296" y1="84871" x2="68296" y2="84871"/>
+                                  <a14:foregroundMark x1="81630" y1="82411" x2="81630" y2="82411"/>
+                                  <a14:foregroundMark x1="94000" y1="81919" x2="94000" y2="81919"/>
+                                  <a14:foregroundMark x1="88963" y1="80197" x2="88963" y2="80197"/>
+                                  <a14:foregroundMark x1="73630" y1="82903" x2="73630" y2="82903"/>
+                                  <a14:foregroundMark x1="77407" y1="82657" x2="77407" y2="82657"/>
+                                  <a14:foregroundMark x1="46000" y1="90898" x2="46000" y2="90898"/>
+                                  <a14:foregroundMark x1="36148" y1="84133" x2="36148" y2="84133"/>
+                                  <a14:foregroundMark x1="39481" y1="82657" x2="39481" y2="82657"/>
+                                  <a14:foregroundMark x1="37852" y1="81181" x2="37704" y2="81919"/>
+                                  <a14:foregroundMark x1="37778" y1="83641" x2="38370" y2="94957"/>
+                                  <a14:foregroundMark x1="38148" y1="95818" x2="37704" y2="88807"/>
+                                  <a14:foregroundMark x1="37704" y1="88807" x2="38148" y2="86224"/>
+                                  <a14:foregroundMark x1="37926" y1="84625" x2="38222" y2="93481"/>
+                                  <a14:foregroundMark x1="37926" y1="83272" x2="38444" y2="95449"/>
+                                </a14:backgroundRemoval>
+                              </a14:imgEffect>
+                              <a14:imgEffect>
+                                <a14:sharpenSoften amount="50000"/>
+                              </a14:imgEffect>
+                              <a14:imgEffect>
+                                <a14:colorTemperature colorTemp="4700"/>
+                              </a14:imgEffect>
+                              <a14:imgEffect>
+                                <a14:brightnessContrast bright="40000" contrast="40000"/>
+                              </a14:imgEffect>
+                            </a14:imgLayer>
+                          </a14:imgProps>
+                        </a:ext>
+                        <a:ext uri="{28A0092B-C50C-407E-A947-70E740481C1C}">
+                          <a14:useLocalDpi xmlns:a14="http://schemas.microsoft.com/office/drawing/2010/main" val="0"/>
+                        </a:ext>
+                      </a:extLst>
+                    </a:blip>
+                    <a:stretch>
+                      <a:fillRect/>
+                    </a:stretch>
+                  </p:blipFill>
                   <p:spPr>
                     <a:xfrm>
-                      <a:off x="766119" y="3607657"/>
-                      <a:ext cx="0" cy="2813602"/>
+                      <a:off x="990730" y="4270491"/>
+                      <a:ext cx="4852398" cy="2150764"/>
                     </a:xfrm>
-                    <a:prstGeom prst="line">
+                    <a:prstGeom prst="rect">
                       <a:avLst/>
                     </a:prstGeom>
-                    <a:ln w="38100">
-                      <a:solidFill>
-                        <a:schemeClr val="tx1">
-                          <a:lumMod val="65000"/>
-                        </a:schemeClr>
-                      </a:solidFill>
-                    </a:ln>
                   </p:spPr>
-                  <p:style>
-                    <a:lnRef idx="1">
-                      <a:schemeClr val="accent1"/>
-                    </a:lnRef>
-                    <a:fillRef idx="0">
-                      <a:schemeClr val="accent1"/>
-                    </a:fillRef>
-                    <a:effectRef idx="0">
-                      <a:schemeClr val="accent1"/>
-                    </a:effectRef>
-                    <a:fontRef idx="minor">
-                      <a:schemeClr val="tx1"/>
-                    </a:fontRef>
-                  </p:style>
-                </p:cxnSp>
-                <p:cxnSp>
-                  <p:nvCxnSpPr>
-                    <p:cNvPr id="29" name="Straight Connector 28">
+                </p:pic>
+                <p:grpSp>
+                  <p:nvGrpSpPr>
+                    <p:cNvPr id="31" name="Group 30">
                       <a:extLst>
                         <a:ext uri="{FF2B5EF4-FFF2-40B4-BE49-F238E27FC236}">
-                          <a16:creationId xmlns:a16="http://schemas.microsoft.com/office/drawing/2014/main" id="{17B4B564-C177-8F4F-8507-5D5E92859149}"/>
+                          <a16:creationId xmlns:a16="http://schemas.microsoft.com/office/drawing/2014/main" id="{A7A10A9D-5DF9-C147-9348-5EBAA194C829}"/>
                         </a:ext>
                       </a:extLst>
                     </p:cNvPr>
-                    <p:cNvCxnSpPr>
-                      <a:cxnSpLocks/>
-                    </p:cNvCxnSpPr>
+                    <p:cNvGrpSpPr/>
                     <p:nvPr/>
-                  </p:nvCxnSpPr>
-                  <p:spPr>
-                    <a:xfrm flipH="1">
-                      <a:off x="766119" y="6421259"/>
-                      <a:ext cx="4671133" cy="0"/>
+                  </p:nvGrpSpPr>
+                  <p:grpSpPr>
+                    <a:xfrm>
+                      <a:off x="1009792" y="3564446"/>
+                      <a:ext cx="4996133" cy="2813602"/>
+                      <a:chOff x="766119" y="3607657"/>
+                      <a:chExt cx="4996133" cy="2813602"/>
                     </a:xfrm>
-                    <a:prstGeom prst="line">
-                      <a:avLst/>
-                    </a:prstGeom>
-                    <a:ln w="38100">
-                      <a:solidFill>
-                        <a:schemeClr val="tx1">
-                          <a:lumMod val="65000"/>
-                        </a:schemeClr>
-                      </a:solidFill>
-                    </a:ln>
-                  </p:spPr>
-                  <p:style>
-                    <a:lnRef idx="1">
-                      <a:schemeClr val="accent1"/>
-                    </a:lnRef>
-                    <a:fillRef idx="0">
-                      <a:schemeClr val="accent1"/>
-                    </a:fillRef>
-                    <a:effectRef idx="0">
-                      <a:schemeClr val="accent1"/>
-                    </a:effectRef>
-                    <a:fontRef idx="minor">
-                      <a:schemeClr val="tx1"/>
-                    </a:fontRef>
-                  </p:style>
-                </p:cxnSp>
+                  </p:grpSpPr>
+                  <p:cxnSp>
+                    <p:nvCxnSpPr>
+                      <p:cNvPr id="28" name="Straight Connector 27">
+                        <a:extLst>
+                          <a:ext uri="{FF2B5EF4-FFF2-40B4-BE49-F238E27FC236}">
+                            <a16:creationId xmlns:a16="http://schemas.microsoft.com/office/drawing/2014/main" id="{E20243C5-930B-934A-A46B-54A60CDC3390}"/>
+                          </a:ext>
+                        </a:extLst>
+                      </p:cNvPr>
+                      <p:cNvCxnSpPr>
+                        <a:cxnSpLocks/>
+                      </p:cNvCxnSpPr>
+                      <p:nvPr/>
+                    </p:nvCxnSpPr>
+                    <p:spPr>
+                      <a:xfrm>
+                        <a:off x="766119" y="3607657"/>
+                        <a:ext cx="0" cy="2812736"/>
+                      </a:xfrm>
+                      <a:prstGeom prst="line">
+                        <a:avLst/>
+                      </a:prstGeom>
+                      <a:ln w="38100">
+                        <a:solidFill>
+                          <a:schemeClr val="tx1">
+                            <a:lumMod val="65000"/>
+                          </a:schemeClr>
+                        </a:solidFill>
+                      </a:ln>
+                    </p:spPr>
+                    <p:style>
+                      <a:lnRef idx="1">
+                        <a:schemeClr val="accent1"/>
+                      </a:lnRef>
+                      <a:fillRef idx="0">
+                        <a:schemeClr val="accent1"/>
+                      </a:fillRef>
+                      <a:effectRef idx="0">
+                        <a:schemeClr val="accent1"/>
+                      </a:effectRef>
+                      <a:fontRef idx="minor">
+                        <a:schemeClr val="tx1"/>
+                      </a:fontRef>
+                    </p:style>
+                  </p:cxnSp>
+                  <p:cxnSp>
+                    <p:nvCxnSpPr>
+                      <p:cNvPr id="29" name="Straight Connector 28">
+                        <a:extLst>
+                          <a:ext uri="{FF2B5EF4-FFF2-40B4-BE49-F238E27FC236}">
+                            <a16:creationId xmlns:a16="http://schemas.microsoft.com/office/drawing/2014/main" id="{17B4B564-C177-8F4F-8507-5D5E92859149}"/>
+                          </a:ext>
+                        </a:extLst>
+                      </p:cNvPr>
+                      <p:cNvCxnSpPr>
+                        <a:cxnSpLocks/>
+                      </p:cNvCxnSpPr>
+                      <p:nvPr/>
+                    </p:nvCxnSpPr>
+                    <p:spPr>
+                      <a:xfrm flipH="1">
+                        <a:off x="766119" y="6421259"/>
+                        <a:ext cx="4996133" cy="0"/>
+                      </a:xfrm>
+                      <a:prstGeom prst="line">
+                        <a:avLst/>
+                      </a:prstGeom>
+                      <a:ln w="38100">
+                        <a:solidFill>
+                          <a:schemeClr val="tx1">
+                            <a:lumMod val="65000"/>
+                          </a:schemeClr>
+                        </a:solidFill>
+                      </a:ln>
+                    </p:spPr>
+                    <p:style>
+                      <a:lnRef idx="1">
+                        <a:schemeClr val="accent1"/>
+                      </a:lnRef>
+                      <a:fillRef idx="0">
+                        <a:schemeClr val="accent1"/>
+                      </a:fillRef>
+                      <a:effectRef idx="0">
+                        <a:schemeClr val="accent1"/>
+                      </a:effectRef>
+                      <a:fontRef idx="minor">
+                        <a:schemeClr val="tx1"/>
+                      </a:fontRef>
+                    </p:style>
+                  </p:cxnSp>
+                </p:grpSp>
               </p:grpSp>
+              <p:sp>
+                <p:nvSpPr>
+                  <p:cNvPr id="33" name="TextBox 32">
+                    <a:extLst>
+                      <a:ext uri="{FF2B5EF4-FFF2-40B4-BE49-F238E27FC236}">
+                        <a16:creationId xmlns:a16="http://schemas.microsoft.com/office/drawing/2014/main" id="{DA23A61C-9B07-6A49-8186-51ED942A3198}"/>
+                      </a:ext>
+                    </a:extLst>
+                  </p:cNvPr>
+                  <p:cNvSpPr txBox="1"/>
+                  <p:nvPr/>
+                </p:nvSpPr>
+                <p:spPr>
+                  <a:xfrm rot="16200000">
+                    <a:off x="-579052" y="4601792"/>
+                    <a:ext cx="1681177" cy="307777"/>
+                  </a:xfrm>
+                  <a:prstGeom prst="rect">
+                    <a:avLst/>
+                  </a:prstGeom>
+                  <a:noFill/>
+                </p:spPr>
+                <p:txBody>
+                  <a:bodyPr wrap="square" rtlCol="0">
+                    <a:spAutoFit/>
+                  </a:bodyPr>
+                  <a:lstStyle/>
+                  <a:p>
+                    <a:pPr algn="ctr"/>
+                    <a:r>
+                      <a:rPr lang="en-US" sz="1400" dirty="0"/>
+                      <a:t>Well Count</a:t>
+                    </a:r>
+                  </a:p>
+                </p:txBody>
+              </p:sp>
+              <p:sp>
+                <p:nvSpPr>
+                  <p:cNvPr id="34" name="TextBox 33">
+                    <a:extLst>
+                      <a:ext uri="{FF2B5EF4-FFF2-40B4-BE49-F238E27FC236}">
+                        <a16:creationId xmlns:a16="http://schemas.microsoft.com/office/drawing/2014/main" id="{4F620CF3-E3B0-244D-B9DB-8BF05E572A40}"/>
+                      </a:ext>
+                    </a:extLst>
+                  </p:cNvPr>
+                  <p:cNvSpPr txBox="1"/>
+                  <p:nvPr/>
+                </p:nvSpPr>
+                <p:spPr>
+                  <a:xfrm>
+                    <a:off x="1457967" y="6588530"/>
+                    <a:ext cx="482123" cy="246221"/>
+                  </a:xfrm>
+                  <a:prstGeom prst="rect">
+                    <a:avLst/>
+                  </a:prstGeom>
+                  <a:noFill/>
+                </p:spPr>
+                <p:txBody>
+                  <a:bodyPr wrap="square" rtlCol="0">
+                    <a:spAutoFit/>
+                  </a:bodyPr>
+                  <a:lstStyle/>
+                  <a:p>
+                    <a:pPr algn="ctr"/>
+                    <a:r>
+                      <a:rPr lang="en-US" sz="1000" dirty="0"/>
+                      <a:t>1955</a:t>
+                    </a:r>
+                  </a:p>
+                </p:txBody>
+              </p:sp>
+              <p:sp>
+                <p:nvSpPr>
+                  <p:cNvPr id="35" name="TextBox 34">
+                    <a:extLst>
+                      <a:ext uri="{FF2B5EF4-FFF2-40B4-BE49-F238E27FC236}">
+                        <a16:creationId xmlns:a16="http://schemas.microsoft.com/office/drawing/2014/main" id="{5FC0F3FB-51EC-1941-970D-58B73C1CF2AA}"/>
+                      </a:ext>
+                    </a:extLst>
+                  </p:cNvPr>
+                  <p:cNvSpPr txBox="1"/>
+                  <p:nvPr/>
+                </p:nvSpPr>
+                <p:spPr>
+                  <a:xfrm>
+                    <a:off x="6016412" y="6588529"/>
+                    <a:ext cx="482123" cy="246221"/>
+                  </a:xfrm>
+                  <a:prstGeom prst="rect">
+                    <a:avLst/>
+                  </a:prstGeom>
+                  <a:noFill/>
+                </p:spPr>
+                <p:txBody>
+                  <a:bodyPr wrap="square" rtlCol="0">
+                    <a:spAutoFit/>
+                  </a:bodyPr>
+                  <a:lstStyle/>
+                  <a:p>
+                    <a:pPr algn="ctr"/>
+                    <a:r>
+                      <a:rPr lang="en-US" sz="1000" dirty="0"/>
+                      <a:t>2015</a:t>
+                    </a:r>
+                  </a:p>
+                </p:txBody>
+              </p:sp>
+              <p:sp>
+                <p:nvSpPr>
+                  <p:cNvPr id="39" name="TextBox 38">
+                    <a:extLst>
+                      <a:ext uri="{FF2B5EF4-FFF2-40B4-BE49-F238E27FC236}">
+                        <a16:creationId xmlns:a16="http://schemas.microsoft.com/office/drawing/2014/main" id="{5B333B4C-340D-A74F-A24E-33C8D7BE9705}"/>
+                      </a:ext>
+                    </a:extLst>
+                  </p:cNvPr>
+                  <p:cNvSpPr txBox="1"/>
+                  <p:nvPr/>
+                </p:nvSpPr>
+                <p:spPr>
+                  <a:xfrm>
+                    <a:off x="4769358" y="6588527"/>
+                    <a:ext cx="482123" cy="246221"/>
+                  </a:xfrm>
+                  <a:prstGeom prst="rect">
+                    <a:avLst/>
+                  </a:prstGeom>
+                  <a:noFill/>
+                </p:spPr>
+                <p:txBody>
+                  <a:bodyPr wrap="square" rtlCol="0">
+                    <a:spAutoFit/>
+                  </a:bodyPr>
+                  <a:lstStyle/>
+                  <a:p>
+                    <a:pPr algn="ctr"/>
+                    <a:r>
+                      <a:rPr lang="en-US" sz="1000" dirty="0"/>
+                      <a:t>2000</a:t>
+                    </a:r>
+                  </a:p>
+                </p:txBody>
+              </p:sp>
             </p:grpSp>
             <p:sp>
               <p:nvSpPr>
-                <p:cNvPr id="33" name="TextBox 32">
+                <p:cNvPr id="41" name="TextBox 40">
                   <a:extLst>
                     <a:ext uri="{FF2B5EF4-FFF2-40B4-BE49-F238E27FC236}">
-                      <a16:creationId xmlns:a16="http://schemas.microsoft.com/office/drawing/2014/main" id="{DA23A61C-9B07-6A49-8186-51ED942A3198}"/>
+                      <a16:creationId xmlns:a16="http://schemas.microsoft.com/office/drawing/2014/main" id="{F69B3E57-206C-9342-86A3-CEBE98825808}"/>
                     </a:ext>
                   </a:extLst>
                 </p:cNvPr>
@@ -9820,9 +10159,9 @@
                 <p:nvPr/>
               </p:nvSpPr>
               <p:spPr>
-                <a:xfrm rot="16200000">
-                  <a:off x="-443537" y="4833525"/>
-                  <a:ext cx="1681177" cy="307777"/>
+                <a:xfrm>
+                  <a:off x="364155" y="4447904"/>
+                  <a:ext cx="594756" cy="307777"/>
                 </a:xfrm>
                 <a:prstGeom prst="rect">
                   <a:avLst/>
@@ -9838,17 +10177,17 @@
                   <a:pPr algn="ctr"/>
                   <a:r>
                     <a:rPr lang="en-US" sz="1400" dirty="0"/>
-                    <a:t>Well Count</a:t>
+                    <a:t>12.5k</a:t>
                   </a:r>
                 </a:p>
               </p:txBody>
             </p:sp>
             <p:sp>
               <p:nvSpPr>
-                <p:cNvPr id="34" name="TextBox 33">
+                <p:cNvPr id="50" name="TextBox 49">
                   <a:extLst>
                     <a:ext uri="{FF2B5EF4-FFF2-40B4-BE49-F238E27FC236}">
-                      <a16:creationId xmlns:a16="http://schemas.microsoft.com/office/drawing/2014/main" id="{4F620CF3-E3B0-244D-B9DB-8BF05E572A40}"/>
+                      <a16:creationId xmlns:a16="http://schemas.microsoft.com/office/drawing/2014/main" id="{4D44C588-A155-0248-A5EB-028F2F7ABB42}"/>
                     </a:ext>
                   </a:extLst>
                 </p:cNvPr>
@@ -9857,8 +10196,8 @@
               </p:nvSpPr>
               <p:spPr>
                 <a:xfrm>
-                  <a:off x="871738" y="6588530"/>
-                  <a:ext cx="482123" cy="246221"/>
+                  <a:off x="438308" y="5658785"/>
+                  <a:ext cx="594756" cy="307777"/>
                 </a:xfrm>
                 <a:prstGeom prst="rect">
                   <a:avLst/>
@@ -9873,80 +10212,8 @@
                 <a:p>
                   <a:pPr algn="ctr"/>
                   <a:r>
-                    <a:rPr lang="en-US" sz="1000" dirty="0"/>
-                    <a:t>1955</a:t>
-                  </a:r>
-                </a:p>
-              </p:txBody>
-            </p:sp>
-            <p:sp>
-              <p:nvSpPr>
-                <p:cNvPr id="35" name="TextBox 34">
-                  <a:extLst>
-                    <a:ext uri="{FF2B5EF4-FFF2-40B4-BE49-F238E27FC236}">
-                      <a16:creationId xmlns:a16="http://schemas.microsoft.com/office/drawing/2014/main" id="{5FC0F3FB-51EC-1941-970D-58B73C1CF2AA}"/>
-                    </a:ext>
-                  </a:extLst>
-                </p:cNvPr>
-                <p:cNvSpPr txBox="1"/>
-                <p:nvPr/>
-              </p:nvSpPr>
-              <p:spPr>
-                <a:xfrm>
-                  <a:off x="5650962" y="6588529"/>
-                  <a:ext cx="482123" cy="246221"/>
-                </a:xfrm>
-                <a:prstGeom prst="rect">
-                  <a:avLst/>
-                </a:prstGeom>
-                <a:noFill/>
-              </p:spPr>
-              <p:txBody>
-                <a:bodyPr wrap="square" rtlCol="0">
-                  <a:spAutoFit/>
-                </a:bodyPr>
-                <a:lstStyle/>
-                <a:p>
-                  <a:pPr algn="ctr"/>
-                  <a:r>
-                    <a:rPr lang="en-US" sz="1000" dirty="0"/>
-                    <a:t>2015</a:t>
-                  </a:r>
-                </a:p>
-              </p:txBody>
-            </p:sp>
-            <p:sp>
-              <p:nvSpPr>
-                <p:cNvPr id="39" name="TextBox 38">
-                  <a:extLst>
-                    <a:ext uri="{FF2B5EF4-FFF2-40B4-BE49-F238E27FC236}">
-                      <a16:creationId xmlns:a16="http://schemas.microsoft.com/office/drawing/2014/main" id="{5B333B4C-340D-A74F-A24E-33C8D7BE9705}"/>
-                    </a:ext>
-                  </a:extLst>
-                </p:cNvPr>
-                <p:cNvSpPr txBox="1"/>
-                <p:nvPr/>
-              </p:nvSpPr>
-              <p:spPr>
-                <a:xfrm>
-                  <a:off x="4403908" y="6588527"/>
-                  <a:ext cx="482123" cy="246221"/>
-                </a:xfrm>
-                <a:prstGeom prst="rect">
-                  <a:avLst/>
-                </a:prstGeom>
-                <a:noFill/>
-              </p:spPr>
-              <p:txBody>
-                <a:bodyPr wrap="square" rtlCol="0">
-                  <a:spAutoFit/>
-                </a:bodyPr>
-                <a:lstStyle/>
-                <a:p>
-                  <a:pPr algn="ctr"/>
-                  <a:r>
-                    <a:rPr lang="en-US" sz="1000" dirty="0"/>
-                    <a:t>2000</a:t>
+                    <a:rPr lang="en-US" sz="1400" dirty="0"/>
+                    <a:t>5k</a:t>
                   </a:r>
                 </a:p>
               </p:txBody>
@@ -9954,10 +10221,10 @@
           </p:grpSp>
           <p:sp>
             <p:nvSpPr>
-              <p:cNvPr id="41" name="TextBox 40">
+              <p:cNvPr id="52" name="TextBox 51">
                 <a:extLst>
                   <a:ext uri="{FF2B5EF4-FFF2-40B4-BE49-F238E27FC236}">
-                    <a16:creationId xmlns:a16="http://schemas.microsoft.com/office/drawing/2014/main" id="{F69B3E57-206C-9342-86A3-CEBE98825808}"/>
+                    <a16:creationId xmlns:a16="http://schemas.microsoft.com/office/drawing/2014/main" id="{ADCE6E01-DB17-484A-A4AD-40F43C41F311}"/>
                   </a:ext>
                 </a:extLst>
               </p:cNvPr>
@@ -9966,8 +10233,8 @@
             </p:nvSpPr>
             <p:spPr>
               <a:xfrm>
-                <a:off x="364155" y="3630642"/>
-                <a:ext cx="594756" cy="307777"/>
+                <a:off x="1789032" y="3123571"/>
+                <a:ext cx="3334762" cy="307777"/>
               </a:xfrm>
               <a:prstGeom prst="rect">
                 <a:avLst/>
@@ -9983,43 +10250,7 @@
                 <a:pPr algn="ctr"/>
                 <a:r>
                   <a:rPr lang="en-US" sz="1400" dirty="0"/>
-                  <a:t>12.5k</a:t>
-                </a:r>
-              </a:p>
-            </p:txBody>
-          </p:sp>
-          <p:sp>
-            <p:nvSpPr>
-              <p:cNvPr id="50" name="TextBox 49">
-                <a:extLst>
-                  <a:ext uri="{FF2B5EF4-FFF2-40B4-BE49-F238E27FC236}">
-                    <a16:creationId xmlns:a16="http://schemas.microsoft.com/office/drawing/2014/main" id="{4D44C588-A155-0248-A5EB-028F2F7ABB42}"/>
-                  </a:ext>
-                </a:extLst>
-              </p:cNvPr>
-              <p:cNvSpPr txBox="1"/>
-              <p:nvPr/>
-            </p:nvSpPr>
-            <p:spPr>
-              <a:xfrm>
-                <a:off x="438308" y="5307315"/>
-                <a:ext cx="594756" cy="307777"/>
-              </a:xfrm>
-              <a:prstGeom prst="rect">
-                <a:avLst/>
-              </a:prstGeom>
-              <a:noFill/>
-            </p:spPr>
-            <p:txBody>
-              <a:bodyPr wrap="square" rtlCol="0">
-                <a:spAutoFit/>
-              </a:bodyPr>
-              <a:lstStyle/>
-              <a:p>
-                <a:pPr algn="ctr"/>
-                <a:r>
-                  <a:rPr lang="en-US" sz="1400" dirty="0"/>
-                  <a:t>5k</a:t>
+                  <a:t>Distribution of Well Construction Year</a:t>
                 </a:r>
               </a:p>
             </p:txBody>
@@ -10027,10 +10258,64 @@
         </p:grpSp>
         <p:sp>
           <p:nvSpPr>
-            <p:cNvPr id="52" name="TextBox 51">
+            <p:cNvPr id="43" name="Rectangle 42">
               <a:extLst>
                 <a:ext uri="{FF2B5EF4-FFF2-40B4-BE49-F238E27FC236}">
-                  <a16:creationId xmlns:a16="http://schemas.microsoft.com/office/drawing/2014/main" id="{ADCE6E01-DB17-484A-A4AD-40F43C41F311}"/>
+                  <a16:creationId xmlns:a16="http://schemas.microsoft.com/office/drawing/2014/main" id="{2807E2F0-2D88-7C40-A693-A940F3CDF252}"/>
+                </a:ext>
+              </a:extLst>
+            </p:cNvPr>
+            <p:cNvSpPr/>
+            <p:nvPr/>
+          </p:nvSpPr>
+          <p:spPr>
+            <a:xfrm rot="16200000">
+              <a:off x="-466703" y="4870807"/>
+              <a:ext cx="3162819" cy="209828"/>
+            </a:xfrm>
+            <a:prstGeom prst="rect">
+              <a:avLst/>
+            </a:prstGeom>
+            <a:solidFill>
+              <a:srgbClr val="C00000"/>
+            </a:solidFill>
+            <a:ln>
+              <a:solidFill>
+                <a:srgbClr val="C00000"/>
+              </a:solidFill>
+            </a:ln>
+          </p:spPr>
+          <p:style>
+            <a:lnRef idx="2">
+              <a:schemeClr val="accent1">
+                <a:shade val="50000"/>
+              </a:schemeClr>
+            </a:lnRef>
+            <a:fillRef idx="1">
+              <a:schemeClr val="accent1"/>
+            </a:fillRef>
+            <a:effectRef idx="0">
+              <a:schemeClr val="accent1"/>
+            </a:effectRef>
+            <a:fontRef idx="minor">
+              <a:schemeClr val="lt1"/>
+            </a:fontRef>
+          </p:style>
+          <p:txBody>
+            <a:bodyPr rtlCol="0" anchor="ctr"/>
+            <a:lstStyle/>
+            <a:p>
+              <a:pPr algn="ctr"/>
+              <a:endParaRPr lang="en-US" dirty="0"/>
+            </a:p>
+          </p:txBody>
+        </p:sp>
+        <p:sp>
+          <p:nvSpPr>
+            <p:cNvPr id="54" name="TextBox 53">
+              <a:extLst>
+                <a:ext uri="{FF2B5EF4-FFF2-40B4-BE49-F238E27FC236}">
+                  <a16:creationId xmlns:a16="http://schemas.microsoft.com/office/drawing/2014/main" id="{F43B70BB-1D38-4245-AFB0-7F4623CCC541}"/>
                 </a:ext>
               </a:extLst>
             </p:cNvPr>
@@ -10039,7 +10324,129 @@
           </p:nvSpPr>
           <p:spPr>
             <a:xfrm>
-              <a:off x="1789032" y="3372765"/>
+              <a:off x="857725" y="6594955"/>
+              <a:ext cx="482123" cy="246221"/>
+            </a:xfrm>
+            <a:prstGeom prst="rect">
+              <a:avLst/>
+            </a:prstGeom>
+            <a:noFill/>
+          </p:spPr>
+          <p:txBody>
+            <a:bodyPr wrap="square" rtlCol="0">
+              <a:spAutoFit/>
+            </a:bodyPr>
+            <a:lstStyle/>
+            <a:p>
+              <a:pPr algn="ctr"/>
+              <a:r>
+                <a:rPr lang="en-US" sz="1000" dirty="0"/>
+                <a:t>0</a:t>
+              </a:r>
+            </a:p>
+          </p:txBody>
+        </p:sp>
+        <p:sp>
+          <p:nvSpPr>
+            <p:cNvPr id="56" name="TextBox 55">
+              <a:extLst>
+                <a:ext uri="{FF2B5EF4-FFF2-40B4-BE49-F238E27FC236}">
+                  <a16:creationId xmlns:a16="http://schemas.microsoft.com/office/drawing/2014/main" id="{EF774E28-2C85-794F-A333-344D78394CCD}"/>
+                </a:ext>
+              </a:extLst>
+            </p:cNvPr>
+            <p:cNvSpPr txBox="1"/>
+            <p:nvPr/>
+          </p:nvSpPr>
+          <p:spPr>
+            <a:xfrm>
+              <a:off x="817328" y="3120306"/>
+              <a:ext cx="594756" cy="307777"/>
+            </a:xfrm>
+            <a:prstGeom prst="rect">
+              <a:avLst/>
+            </a:prstGeom>
+            <a:noFill/>
+          </p:spPr>
+          <p:txBody>
+            <a:bodyPr wrap="square" rtlCol="0">
+              <a:spAutoFit/>
+            </a:bodyPr>
+            <a:lstStyle/>
+            <a:p>
+              <a:pPr algn="ctr"/>
+              <a:r>
+                <a:rPr lang="en-US" sz="1400" dirty="0"/>
+                <a:t>19k</a:t>
+              </a:r>
+            </a:p>
+          </p:txBody>
+        </p:sp>
+        <p:sp>
+          <p:nvSpPr>
+            <p:cNvPr id="59" name="Bent Arrow 58">
+              <a:extLst>
+                <a:ext uri="{FF2B5EF4-FFF2-40B4-BE49-F238E27FC236}">
+                  <a16:creationId xmlns:a16="http://schemas.microsoft.com/office/drawing/2014/main" id="{82435AE5-B065-6048-9CB7-F49AB5CA1103}"/>
+                </a:ext>
+              </a:extLst>
+            </p:cNvPr>
+            <p:cNvSpPr/>
+            <p:nvPr/>
+          </p:nvSpPr>
+          <p:spPr>
+            <a:xfrm rot="5400000">
+              <a:off x="2401277" y="3121590"/>
+              <a:ext cx="922716" cy="2908367"/>
+            </a:xfrm>
+            <a:prstGeom prst="bentArrow">
+              <a:avLst/>
+            </a:prstGeom>
+          </p:spPr>
+          <p:style>
+            <a:lnRef idx="2">
+              <a:schemeClr val="accent1">
+                <a:shade val="50000"/>
+              </a:schemeClr>
+            </a:lnRef>
+            <a:fillRef idx="1">
+              <a:schemeClr val="accent1"/>
+            </a:fillRef>
+            <a:effectRef idx="0">
+              <a:schemeClr val="accent1"/>
+            </a:effectRef>
+            <a:fontRef idx="minor">
+              <a:schemeClr val="lt1"/>
+            </a:fontRef>
+          </p:style>
+          <p:txBody>
+            <a:bodyPr rtlCol="0" anchor="ctr"/>
+            <a:lstStyle/>
+            <a:p>
+              <a:pPr algn="ctr"/>
+              <a:endParaRPr lang="en-US">
+                <a:solidFill>
+                  <a:schemeClr val="tx1"/>
+                </a:solidFill>
+              </a:endParaRPr>
+            </a:p>
+          </p:txBody>
+        </p:sp>
+        <p:sp>
+          <p:nvSpPr>
+            <p:cNvPr id="60" name="TextBox 59">
+              <a:extLst>
+                <a:ext uri="{FF2B5EF4-FFF2-40B4-BE49-F238E27FC236}">
+                  <a16:creationId xmlns:a16="http://schemas.microsoft.com/office/drawing/2014/main" id="{9ABAD41B-607C-304D-965C-0A42FB361FAE}"/>
+                </a:ext>
+              </a:extLst>
+            </p:cNvPr>
+            <p:cNvSpPr txBox="1"/>
+            <p:nvPr/>
+          </p:nvSpPr>
+          <p:spPr>
+            <a:xfrm>
+              <a:off x="989035" y="4065831"/>
               <a:ext cx="3334762" cy="307777"/>
             </a:xfrm>
             <a:prstGeom prst="rect">
@@ -10056,7 +10463,7 @@
               <a:pPr algn="ctr"/>
               <a:r>
                 <a:rPr lang="en-US" sz="1400" dirty="0"/>
-                <a:t>Distribution of Well Construction Year</a:t>
+                <a:t>Random Imputation</a:t>
               </a:r>
             </a:p>
           </p:txBody>
@@ -11979,7 +12386,7 @@
           </p:nvSpPr>
           <p:spPr>
             <a:xfrm>
-              <a:off x="595558" y="2682473"/>
+              <a:off x="595558" y="4048192"/>
               <a:ext cx="2521839" cy="400110"/>
             </a:xfrm>
             <a:prstGeom prst="rect">
@@ -12019,7 +12426,7 @@
           </p:nvSpPr>
           <p:spPr>
             <a:xfrm>
-              <a:off x="606540" y="3368273"/>
+              <a:off x="606540" y="2680963"/>
               <a:ext cx="2521839" cy="400110"/>
             </a:xfrm>
             <a:prstGeom prst="rect">
@@ -12055,7 +12462,7 @@
           </p:nvSpPr>
           <p:spPr>
             <a:xfrm>
-              <a:off x="606540" y="4074982"/>
+              <a:off x="606540" y="3347056"/>
               <a:ext cx="2521839" cy="400110"/>
             </a:xfrm>
             <a:prstGeom prst="rect">
@@ -12091,7 +12498,7 @@
           </p:nvSpPr>
           <p:spPr>
             <a:xfrm>
-              <a:off x="595559" y="4766526"/>
+              <a:off x="595559" y="4724191"/>
               <a:ext cx="2521839" cy="400110"/>
             </a:xfrm>
             <a:prstGeom prst="rect">
@@ -13080,7 +13487,7 @@
                 <a:pPr algn="ctr"/>
                 <a:r>
                   <a:rPr lang="en-US" sz="2500" dirty="0"/>
-                  <a:t>475 FH</a:t>
+                  <a:t>31 FH</a:t>
                 </a:r>
               </a:p>
             </p:txBody>
@@ -13116,7 +13523,7 @@
                 <a:pPr algn="ctr"/>
                 <a:r>
                   <a:rPr lang="en-US" sz="2500" dirty="0"/>
-                  <a:t>150 FH</a:t>
+                  <a:t>23 FH</a:t>
                 </a:r>
               </a:p>
             </p:txBody>
@@ -13516,7 +13923,7 @@
               <a:pPr algn="r"/>
               <a:r>
                 <a:rPr lang="en-US" sz="2000" dirty="0"/>
-                <a:t>Dry</a:t>
+                <a:t>Seasonal</a:t>
               </a:r>
             </a:p>
           </p:txBody>
@@ -13552,7 +13959,7 @@
               <a:pPr algn="r"/>
               <a:r>
                 <a:rPr lang="en-US" sz="2000" dirty="0"/>
-                <a:t>Seasonal</a:t>
+                <a:t>Dry</a:t>
               </a:r>
             </a:p>
           </p:txBody>
@@ -13660,7 +14067,7 @@
               <a:pPr algn="ctr"/>
               <a:r>
                 <a:rPr lang="en-US" sz="2000" dirty="0"/>
-                <a:t>426 FH</a:t>
+                <a:t>30 FH</a:t>
               </a:r>
             </a:p>
           </p:txBody>
@@ -13696,7 +14103,7 @@
               <a:pPr algn="ctr"/>
               <a:r>
                 <a:rPr lang="en-US" sz="2000" dirty="0"/>
-                <a:t>260 FH</a:t>
+                <a:t>28 FH</a:t>
               </a:r>
             </a:p>
           </p:txBody>
@@ -13732,7 +14139,7 @@
               <a:pPr algn="ctr"/>
               <a:r>
                 <a:rPr lang="en-US" sz="2000" dirty="0"/>
-                <a:t>135 FH</a:t>
+                <a:t>22 FH</a:t>
               </a:r>
             </a:p>
           </p:txBody>
@@ -13768,7 +14175,7 @@
               <a:pPr algn="ctr"/>
               <a:r>
                 <a:rPr lang="en-US" sz="2000" dirty="0"/>
-                <a:t>116 FH</a:t>
+                <a:t>18 FH</a:t>
               </a:r>
             </a:p>
           </p:txBody>
@@ -13804,7 +14211,7 @@
               <a:pPr algn="ctr"/>
               <a:r>
                 <a:rPr lang="en-US" sz="2000" dirty="0"/>
-                <a:t>68 FH</a:t>
+                <a:t>16 FH</a:t>
               </a:r>
             </a:p>
           </p:txBody>

</xml_diff>